<commit_message>
[RI2 ch1] Replaced OPNFV with Anuket in community figure
This patch updates the community relationship figure in RI2 chapter1,
replacing OPNFV with Anuket.
</commit_message>
<xml_diff>
--- a/doc/ref_impl/cntt-ri2/artefacts/ri2-ch01-relationship_of_communities.pptx
+++ b/doc/ref_impl/cntt-ri2/artefacts/ri2-ch01-relationship_of_communities.pptx
@@ -261,7 +261,7 @@
           <a:p>
             <a:fld id="{68271C0A-928C-C849-B2F5-B85B90885069}" type="datetimeFigureOut">
               <a:rPr lang="en-US" smtClean="0"/>
-              <a:t>7/23/20</a:t>
+              <a:t>6/23/2021</a:t>
             </a:fld>
             <a:endParaRPr lang="en-US"/>
           </a:p>
@@ -461,7 +461,7 @@
           <a:p>
             <a:fld id="{68271C0A-928C-C849-B2F5-B85B90885069}" type="datetimeFigureOut">
               <a:rPr lang="en-US" smtClean="0"/>
-              <a:t>7/23/20</a:t>
+              <a:t>6/23/2021</a:t>
             </a:fld>
             <a:endParaRPr lang="en-US"/>
           </a:p>
@@ -671,7 +671,7 @@
           <a:p>
             <a:fld id="{68271C0A-928C-C849-B2F5-B85B90885069}" type="datetimeFigureOut">
               <a:rPr lang="en-US" smtClean="0"/>
-              <a:t>7/23/20</a:t>
+              <a:t>6/23/2021</a:t>
             </a:fld>
             <a:endParaRPr lang="en-US"/>
           </a:p>
@@ -871,7 +871,7 @@
           <a:p>
             <a:fld id="{68271C0A-928C-C849-B2F5-B85B90885069}" type="datetimeFigureOut">
               <a:rPr lang="en-US" smtClean="0"/>
-              <a:t>7/23/20</a:t>
+              <a:t>6/23/2021</a:t>
             </a:fld>
             <a:endParaRPr lang="en-US"/>
           </a:p>
@@ -1147,7 +1147,7 @@
           <a:p>
             <a:fld id="{68271C0A-928C-C849-B2F5-B85B90885069}" type="datetimeFigureOut">
               <a:rPr lang="en-US" smtClean="0"/>
-              <a:t>7/23/20</a:t>
+              <a:t>6/23/2021</a:t>
             </a:fld>
             <a:endParaRPr lang="en-US"/>
           </a:p>
@@ -1415,7 +1415,7 @@
           <a:p>
             <a:fld id="{68271C0A-928C-C849-B2F5-B85B90885069}" type="datetimeFigureOut">
               <a:rPr lang="en-US" smtClean="0"/>
-              <a:t>7/23/20</a:t>
+              <a:t>6/23/2021</a:t>
             </a:fld>
             <a:endParaRPr lang="en-US"/>
           </a:p>
@@ -1830,7 +1830,7 @@
           <a:p>
             <a:fld id="{68271C0A-928C-C849-B2F5-B85B90885069}" type="datetimeFigureOut">
               <a:rPr lang="en-US" smtClean="0"/>
-              <a:t>7/23/20</a:t>
+              <a:t>6/23/2021</a:t>
             </a:fld>
             <a:endParaRPr lang="en-US"/>
           </a:p>
@@ -1972,7 +1972,7 @@
           <a:p>
             <a:fld id="{68271C0A-928C-C849-B2F5-B85B90885069}" type="datetimeFigureOut">
               <a:rPr lang="en-US" smtClean="0"/>
-              <a:t>7/23/20</a:t>
+              <a:t>6/23/2021</a:t>
             </a:fld>
             <a:endParaRPr lang="en-US"/>
           </a:p>
@@ -2085,7 +2085,7 @@
           <a:p>
             <a:fld id="{68271C0A-928C-C849-B2F5-B85B90885069}" type="datetimeFigureOut">
               <a:rPr lang="en-US" smtClean="0"/>
-              <a:t>7/23/20</a:t>
+              <a:t>6/23/2021</a:t>
             </a:fld>
             <a:endParaRPr lang="en-US"/>
           </a:p>
@@ -2398,7 +2398,7 @@
           <a:p>
             <a:fld id="{68271C0A-928C-C849-B2F5-B85B90885069}" type="datetimeFigureOut">
               <a:rPr lang="en-US" smtClean="0"/>
-              <a:t>7/23/20</a:t>
+              <a:t>6/23/2021</a:t>
             </a:fld>
             <a:endParaRPr lang="en-US"/>
           </a:p>
@@ -2687,7 +2687,7 @@
           <a:p>
             <a:fld id="{68271C0A-928C-C849-B2F5-B85B90885069}" type="datetimeFigureOut">
               <a:rPr lang="en-US" smtClean="0"/>
-              <a:t>7/23/20</a:t>
+              <a:t>6/23/2021</a:t>
             </a:fld>
             <a:endParaRPr lang="en-US"/>
           </a:p>
@@ -2930,7 +2930,7 @@
           <a:p>
             <a:fld id="{68271C0A-928C-C849-B2F5-B85B90885069}" type="datetimeFigureOut">
               <a:rPr lang="en-US" smtClean="0"/>
-              <a:t>7/23/20</a:t>
+              <a:t>6/23/2021</a:t>
             </a:fld>
             <a:endParaRPr lang="en-US"/>
           </a:p>
@@ -3400,12 +3400,20 @@
           <a:p>
             <a:pPr marL="96838"/>
             <a:r>
+              <a:rPr lang="LID4096" sz="1400" dirty="0">
+                <a:solidFill>
+                  <a:schemeClr val="tx1"/>
+                </a:solidFill>
+              </a:rPr>
+              <a:t>Anuket</a:t>
+            </a:r>
+            <a:r>
               <a:rPr lang="en-US" sz="1400" dirty="0">
                 <a:solidFill>
                   <a:schemeClr val="tx1"/>
                 </a:solidFill>
               </a:rPr>
-              <a:t>OPNFV test tooling / RC-2 test suite</a:t>
+              <a:t> test tooling / RC-2 test suite</a:t>
             </a:r>
           </a:p>
         </p:txBody>
@@ -3530,12 +3538,20 @@
               </a:tabLst>
             </a:pPr>
             <a:r>
+              <a:rPr lang="LID4096" sz="1400" dirty="0">
+                <a:solidFill>
+                  <a:schemeClr val="tx1"/>
+                </a:solidFill>
+              </a:rPr>
+              <a:t>Anuket</a:t>
+            </a:r>
+            <a:r>
               <a:rPr lang="en-US" sz="1400" dirty="0">
                 <a:solidFill>
                   <a:schemeClr val="tx1"/>
                 </a:solidFill>
               </a:rPr>
-              <a:t>OPNFV </a:t>
+              <a:t> </a:t>
             </a:r>
             <a:r>
               <a:rPr lang="en-US" sz="1400" dirty="0" err="1">

</xml_diff>

<commit_message>
[RI2 ch1] Replaced OPNFV with Anuket in community figure (#2508)
This patch updates the community relationship figure in RI2 chapter1,
replacing OPNFV with Anuket.
</commit_message>
<xml_diff>
--- a/doc/ref_impl/cntt-ri2/artefacts/ri2-ch01-relationship_of_communities.pptx
+++ b/doc/ref_impl/cntt-ri2/artefacts/ri2-ch01-relationship_of_communities.pptx
@@ -261,7 +261,7 @@
           <a:p>
             <a:fld id="{68271C0A-928C-C849-B2F5-B85B90885069}" type="datetimeFigureOut">
               <a:rPr lang="en-US" smtClean="0"/>
-              <a:t>7/23/20</a:t>
+              <a:t>6/23/2021</a:t>
             </a:fld>
             <a:endParaRPr lang="en-US"/>
           </a:p>
@@ -461,7 +461,7 @@
           <a:p>
             <a:fld id="{68271C0A-928C-C849-B2F5-B85B90885069}" type="datetimeFigureOut">
               <a:rPr lang="en-US" smtClean="0"/>
-              <a:t>7/23/20</a:t>
+              <a:t>6/23/2021</a:t>
             </a:fld>
             <a:endParaRPr lang="en-US"/>
           </a:p>
@@ -671,7 +671,7 @@
           <a:p>
             <a:fld id="{68271C0A-928C-C849-B2F5-B85B90885069}" type="datetimeFigureOut">
               <a:rPr lang="en-US" smtClean="0"/>
-              <a:t>7/23/20</a:t>
+              <a:t>6/23/2021</a:t>
             </a:fld>
             <a:endParaRPr lang="en-US"/>
           </a:p>
@@ -871,7 +871,7 @@
           <a:p>
             <a:fld id="{68271C0A-928C-C849-B2F5-B85B90885069}" type="datetimeFigureOut">
               <a:rPr lang="en-US" smtClean="0"/>
-              <a:t>7/23/20</a:t>
+              <a:t>6/23/2021</a:t>
             </a:fld>
             <a:endParaRPr lang="en-US"/>
           </a:p>
@@ -1147,7 +1147,7 @@
           <a:p>
             <a:fld id="{68271C0A-928C-C849-B2F5-B85B90885069}" type="datetimeFigureOut">
               <a:rPr lang="en-US" smtClean="0"/>
-              <a:t>7/23/20</a:t>
+              <a:t>6/23/2021</a:t>
             </a:fld>
             <a:endParaRPr lang="en-US"/>
           </a:p>
@@ -1415,7 +1415,7 @@
           <a:p>
             <a:fld id="{68271C0A-928C-C849-B2F5-B85B90885069}" type="datetimeFigureOut">
               <a:rPr lang="en-US" smtClean="0"/>
-              <a:t>7/23/20</a:t>
+              <a:t>6/23/2021</a:t>
             </a:fld>
             <a:endParaRPr lang="en-US"/>
           </a:p>
@@ -1830,7 +1830,7 @@
           <a:p>
             <a:fld id="{68271C0A-928C-C849-B2F5-B85B90885069}" type="datetimeFigureOut">
               <a:rPr lang="en-US" smtClean="0"/>
-              <a:t>7/23/20</a:t>
+              <a:t>6/23/2021</a:t>
             </a:fld>
             <a:endParaRPr lang="en-US"/>
           </a:p>
@@ -1972,7 +1972,7 @@
           <a:p>
             <a:fld id="{68271C0A-928C-C849-B2F5-B85B90885069}" type="datetimeFigureOut">
               <a:rPr lang="en-US" smtClean="0"/>
-              <a:t>7/23/20</a:t>
+              <a:t>6/23/2021</a:t>
             </a:fld>
             <a:endParaRPr lang="en-US"/>
           </a:p>
@@ -2085,7 +2085,7 @@
           <a:p>
             <a:fld id="{68271C0A-928C-C849-B2F5-B85B90885069}" type="datetimeFigureOut">
               <a:rPr lang="en-US" smtClean="0"/>
-              <a:t>7/23/20</a:t>
+              <a:t>6/23/2021</a:t>
             </a:fld>
             <a:endParaRPr lang="en-US"/>
           </a:p>
@@ -2398,7 +2398,7 @@
           <a:p>
             <a:fld id="{68271C0A-928C-C849-B2F5-B85B90885069}" type="datetimeFigureOut">
               <a:rPr lang="en-US" smtClean="0"/>
-              <a:t>7/23/20</a:t>
+              <a:t>6/23/2021</a:t>
             </a:fld>
             <a:endParaRPr lang="en-US"/>
           </a:p>
@@ -2687,7 +2687,7 @@
           <a:p>
             <a:fld id="{68271C0A-928C-C849-B2F5-B85B90885069}" type="datetimeFigureOut">
               <a:rPr lang="en-US" smtClean="0"/>
-              <a:t>7/23/20</a:t>
+              <a:t>6/23/2021</a:t>
             </a:fld>
             <a:endParaRPr lang="en-US"/>
           </a:p>
@@ -2930,7 +2930,7 @@
           <a:p>
             <a:fld id="{68271C0A-928C-C849-B2F5-B85B90885069}" type="datetimeFigureOut">
               <a:rPr lang="en-US" smtClean="0"/>
-              <a:t>7/23/20</a:t>
+              <a:t>6/23/2021</a:t>
             </a:fld>
             <a:endParaRPr lang="en-US"/>
           </a:p>
@@ -3400,12 +3400,20 @@
           <a:p>
             <a:pPr marL="96838"/>
             <a:r>
+              <a:rPr lang="LID4096" sz="1400" dirty="0">
+                <a:solidFill>
+                  <a:schemeClr val="tx1"/>
+                </a:solidFill>
+              </a:rPr>
+              <a:t>Anuket</a:t>
+            </a:r>
+            <a:r>
               <a:rPr lang="en-US" sz="1400" dirty="0">
                 <a:solidFill>
                   <a:schemeClr val="tx1"/>
                 </a:solidFill>
               </a:rPr>
-              <a:t>OPNFV test tooling / RC-2 test suite</a:t>
+              <a:t> test tooling / RC-2 test suite</a:t>
             </a:r>
           </a:p>
         </p:txBody>
@@ -3530,12 +3538,20 @@
               </a:tabLst>
             </a:pPr>
             <a:r>
+              <a:rPr lang="LID4096" sz="1400" dirty="0">
+                <a:solidFill>
+                  <a:schemeClr val="tx1"/>
+                </a:solidFill>
+              </a:rPr>
+              <a:t>Anuket</a:t>
+            </a:r>
+            <a:r>
               <a:rPr lang="en-US" sz="1400" dirty="0">
                 <a:solidFill>
                   <a:schemeClr val="tx1"/>
                 </a:solidFill>
               </a:rPr>
-              <a:t>OPNFV </a:t>
+              <a:t> </a:t>
             </a:r>
             <a:r>
               <a:rPr lang="en-US" sz="1400" dirty="0" err="1">

</xml_diff>